<commit_message>
update training for topic 06
</commit_message>
<xml_diff>
--- a/lectures/topic_06/presentationTopic_06.pptx
+++ b/lectures/topic_06/presentationTopic_06.pptx
@@ -303,7 +303,7 @@
           <a:p>
             <a:fld id="{0809DE30-6180-461D-86C2-508ADE9061B4}" type="datetimeFigureOut">
               <a:rPr lang="en-US" smtClean="0"/>
-              <a:t>9/19/2023</a:t>
+              <a:t>9/22/2023</a:t>
             </a:fld>
             <a:endParaRPr lang="en-US"/>
           </a:p>
@@ -641,7 +641,7 @@
           <a:p>
             <a:fld id="{0809DE30-6180-461D-86C2-508ADE9061B4}" type="datetimeFigureOut">
               <a:rPr lang="en-US" smtClean="0"/>
-              <a:t>9/19/2023</a:t>
+              <a:t>9/22/2023</a:t>
             </a:fld>
             <a:endParaRPr lang="en-US"/>
           </a:p>
@@ -1042,7 +1042,7 @@
           <a:p>
             <a:fld id="{0809DE30-6180-461D-86C2-508ADE9061B4}" type="datetimeFigureOut">
               <a:rPr lang="en-US" smtClean="0"/>
-              <a:t>9/19/2023</a:t>
+              <a:t>9/22/2023</a:t>
             </a:fld>
             <a:endParaRPr lang="en-US"/>
           </a:p>
@@ -1378,7 +1378,7 @@
           <a:p>
             <a:fld id="{0809DE30-6180-461D-86C2-508ADE9061B4}" type="datetimeFigureOut">
               <a:rPr lang="en-US" smtClean="0"/>
-              <a:t>9/19/2023</a:t>
+              <a:t>9/22/2023</a:t>
             </a:fld>
             <a:endParaRPr lang="en-US"/>
           </a:p>
@@ -1698,7 +1698,7 @@
           <a:p>
             <a:fld id="{0809DE30-6180-461D-86C2-508ADE9061B4}" type="datetimeFigureOut">
               <a:rPr lang="en-US" smtClean="0"/>
-              <a:t>9/19/2023</a:t>
+              <a:t>9/22/2023</a:t>
             </a:fld>
             <a:endParaRPr lang="en-US"/>
           </a:p>
@@ -2094,7 +2094,7 @@
           <a:p>
             <a:fld id="{0809DE30-6180-461D-86C2-508ADE9061B4}" type="datetimeFigureOut">
               <a:rPr lang="en-US" smtClean="0"/>
-              <a:t>9/19/2023</a:t>
+              <a:t>9/22/2023</a:t>
             </a:fld>
             <a:endParaRPr lang="en-US"/>
           </a:p>
@@ -2351,7 +2351,7 @@
           <a:p>
             <a:fld id="{0809DE30-6180-461D-86C2-508ADE9061B4}" type="datetimeFigureOut">
               <a:rPr lang="en-US" smtClean="0"/>
-              <a:t>9/19/2023</a:t>
+              <a:t>9/22/2023</a:t>
             </a:fld>
             <a:endParaRPr lang="en-US"/>
           </a:p>
@@ -2613,7 +2613,7 @@
           <a:p>
             <a:fld id="{0809DE30-6180-461D-86C2-508ADE9061B4}" type="datetimeFigureOut">
               <a:rPr lang="en-US" smtClean="0"/>
-              <a:t>9/19/2023</a:t>
+              <a:t>9/22/2023</a:t>
             </a:fld>
             <a:endParaRPr lang="en-US"/>
           </a:p>
@@ -2873,7 +2873,7 @@
           <a:p>
             <a:fld id="{0809DE30-6180-461D-86C2-508ADE9061B4}" type="datetimeFigureOut">
               <a:rPr lang="en-US" smtClean="0"/>
-              <a:t>9/19/2023</a:t>
+              <a:t>9/22/2023</a:t>
             </a:fld>
             <a:endParaRPr lang="en-US"/>
           </a:p>
@@ -3202,7 +3202,7 @@
           <a:p>
             <a:fld id="{0809DE30-6180-461D-86C2-508ADE9061B4}" type="datetimeFigureOut">
               <a:rPr lang="en-US" smtClean="0"/>
-              <a:t>9/19/2023</a:t>
+              <a:t>9/22/2023</a:t>
             </a:fld>
             <a:endParaRPr lang="en-US"/>
           </a:p>
@@ -3525,7 +3525,7 @@
           <a:p>
             <a:fld id="{0809DE30-6180-461D-86C2-508ADE9061B4}" type="datetimeFigureOut">
               <a:rPr lang="en-US" smtClean="0"/>
-              <a:t>9/19/2023</a:t>
+              <a:t>9/22/2023</a:t>
             </a:fld>
             <a:endParaRPr lang="en-US"/>
           </a:p>
@@ -3982,7 +3982,7 @@
           <a:p>
             <a:fld id="{0809DE30-6180-461D-86C2-508ADE9061B4}" type="datetimeFigureOut">
               <a:rPr lang="en-US" smtClean="0"/>
-              <a:t>9/19/2023</a:t>
+              <a:t>9/22/2023</a:t>
             </a:fld>
             <a:endParaRPr lang="en-US"/>
           </a:p>
@@ -4187,7 +4187,7 @@
           <a:p>
             <a:fld id="{0809DE30-6180-461D-86C2-508ADE9061B4}" type="datetimeFigureOut">
               <a:rPr lang="en-US" smtClean="0"/>
-              <a:t>9/19/2023</a:t>
+              <a:t>9/22/2023</a:t>
             </a:fld>
             <a:endParaRPr lang="en-US"/>
           </a:p>
@@ -4364,7 +4364,7 @@
           <a:p>
             <a:fld id="{0809DE30-6180-461D-86C2-508ADE9061B4}" type="datetimeFigureOut">
               <a:rPr lang="en-US" smtClean="0"/>
-              <a:t>9/19/2023</a:t>
+              <a:t>9/22/2023</a:t>
             </a:fld>
             <a:endParaRPr lang="en-US"/>
           </a:p>
@@ -4697,7 +4697,7 @@
           <a:p>
             <a:fld id="{0809DE30-6180-461D-86C2-508ADE9061B4}" type="datetimeFigureOut">
               <a:rPr lang="en-US" smtClean="0"/>
-              <a:t>9/19/2023</a:t>
+              <a:t>9/22/2023</a:t>
             </a:fld>
             <a:endParaRPr lang="en-US"/>
           </a:p>
@@ -5042,7 +5042,7 @@
           <a:p>
             <a:fld id="{0809DE30-6180-461D-86C2-508ADE9061B4}" type="datetimeFigureOut">
               <a:rPr lang="en-US" smtClean="0"/>
-              <a:t>9/19/2023</a:t>
+              <a:t>9/22/2023</a:t>
             </a:fld>
             <a:endParaRPr lang="en-US"/>
           </a:p>
@@ -7159,7 +7159,7 @@
           <a:p>
             <a:fld id="{0809DE30-6180-461D-86C2-508ADE9061B4}" type="datetimeFigureOut">
               <a:rPr lang="en-US" smtClean="0"/>
-              <a:t>9/19/2023</a:t>
+              <a:t>9/22/2023</a:t>
             </a:fld>
             <a:endParaRPr lang="en-US"/>
           </a:p>
@@ -8129,20 +8129,6 @@
             </a:r>
           </a:p>
           <a:p>
-            <a:r>
-              <a:rPr lang="uk-UA" sz="2800" dirty="0"/>
-              <a:t>Функція </a:t>
-            </a:r>
-            <a:r>
-              <a:rPr lang="en-US" sz="2800" b="1" dirty="0" err="1"/>
-              <a:t>readlines</a:t>
-            </a:r>
-            <a:r>
-              <a:rPr lang="uk-UA" sz="2800" dirty="0"/>
-              <a:t>() використовується для читання всіх рядків із файлу.</a:t>
-            </a:r>
-          </a:p>
-          <a:p>
             <a:endParaRPr lang="en-US" sz="2800" dirty="0"/>
           </a:p>
         </p:txBody>
@@ -8271,8 +8257,12 @@
           <a:lstStyle/>
           <a:p>
             <a:r>
+              <a:rPr lang="en-US" b="1" dirty="0"/>
+              <a:t>CSV </a:t>
+            </a:r>
+            <a:r>
               <a:rPr lang="uk-UA" b="1" dirty="0"/>
-              <a:t>Лямда функції</a:t>
+              <a:t>файли</a:t>
             </a:r>
             <a:endParaRPr lang="en-US" b="1" dirty="0"/>
           </a:p>
@@ -8307,8 +8297,73 @@
           <a:lstStyle/>
           <a:p>
             <a:r>
-              <a:rPr lang="uk-UA" sz="2800"/>
-              <a:t>…</a:t>
+              <a:rPr lang="uk-UA" sz="2800" dirty="0"/>
+              <a:t>Великою популярністю в обробці донних відіграють файли в форматі </a:t>
+            </a:r>
+            <a:r>
+              <a:rPr lang="en-US" sz="2800" b="1" dirty="0"/>
+              <a:t>CSV</a:t>
+            </a:r>
+            <a:r>
+              <a:rPr lang="en-US" sz="2800" dirty="0"/>
+              <a:t> (Comma Separated Values)</a:t>
+            </a:r>
+            <a:endParaRPr lang="uk-UA" sz="2800" dirty="0"/>
+          </a:p>
+          <a:p>
+            <a:r>
+              <a:rPr lang="uk-UA" sz="2800" dirty="0"/>
+              <a:t>Для роботи з </a:t>
+            </a:r>
+            <a:r>
+              <a:rPr lang="en-US" sz="2800" b="1" dirty="0"/>
+              <a:t>CSV</a:t>
+            </a:r>
+            <a:r>
+              <a:rPr lang="uk-UA" sz="2800" dirty="0"/>
+              <a:t> файлами використовується модуль з аналогічною назвою.</a:t>
+            </a:r>
+          </a:p>
+          <a:p>
+            <a:r>
+              <a:rPr lang="uk-UA" sz="2800" dirty="0"/>
+              <a:t>Основні методи роботи з </a:t>
+            </a:r>
+            <a:r>
+              <a:rPr lang="en-US" sz="2800" b="1" dirty="0"/>
+              <a:t>CSV</a:t>
+            </a:r>
+            <a:r>
+              <a:rPr lang="uk-UA" sz="2800" b="1" dirty="0"/>
+              <a:t> </a:t>
+            </a:r>
+            <a:r>
+              <a:rPr lang="uk-UA" sz="2800" dirty="0"/>
+              <a:t>файлами: </a:t>
+            </a:r>
+            <a:r>
+              <a:rPr lang="en-US" sz="2800" b="1" dirty="0" err="1"/>
+              <a:t>DictReader</a:t>
+            </a:r>
+            <a:r>
+              <a:rPr lang="uk-UA" sz="2800" b="1" dirty="0"/>
+              <a:t>()</a:t>
+            </a:r>
+            <a:r>
+              <a:rPr lang="uk-UA" sz="2800" dirty="0"/>
+              <a:t>, </a:t>
+            </a:r>
+            <a:r>
+              <a:rPr lang="en-US" sz="2800" b="1" dirty="0" err="1"/>
+              <a:t>DictWriter</a:t>
+            </a:r>
+            <a:r>
+              <a:rPr lang="uk-UA" sz="2800" b="1" dirty="0"/>
+              <a:t>()</a:t>
+            </a:r>
+            <a:r>
+              <a:rPr lang="uk-UA" sz="2800" dirty="0"/>
+              <a:t>.</a:t>
             </a:r>
             <a:endParaRPr lang="en-US" sz="2800" dirty="0"/>
           </a:p>

</xml_diff>